<commit_message>
Thesis is in final state
</commit_message>
<xml_diff>
--- a/Thesis/tex/graphics/pgfplots/cha5/Bosch/Blockschaltbild.pptx
+++ b/Thesis/tex/graphics/pgfplots/cha5/Bosch/Blockschaltbild.pptx
@@ -631,7 +631,7 @@
               </a14:hiddenFill>
             </a:ext>
             <a:ext uri="{FAA26D3D-D897-4be2-8F04-BA451C77F1D7}">
-              <ma14:placeholderFlag xmlns:ma14="http://schemas.microsoft.com/office/mac/drawingml/2011/main" xmlns="" val="1"/>
+              <ma14:placeholderFlag xmlns="" xmlns:ma14="http://schemas.microsoft.com/office/mac/drawingml/2011/main" val="1"/>
             </a:ext>
           </a:extLst>
         </p:spPr>
@@ -2485,7 +2485,7 @@
               </a14:hiddenLine>
             </a:ext>
             <a:ext uri="{FAA26D3D-D897-4be2-8F04-BA451C77F1D7}">
-              <ma14:placeholderFlag xmlns:ma14="http://schemas.microsoft.com/office/mac/drawingml/2011/main" xmlns="" val="1"/>
+              <ma14:placeholderFlag xmlns="" xmlns:ma14="http://schemas.microsoft.com/office/mac/drawingml/2011/main" val="1"/>
             </a:ext>
           </a:extLst>
         </p:spPr>
@@ -2621,7 +2621,7 @@
             </a:pPr>
             <a:fld id="{5F8A39F7-97EC-2142-B264-F44D66BBE89D}" type="datetime1">
               <a:rPr lang="en-GB" noProof="0" smtClean="0"/>
-              <a:t>18/02/2021</a:t>
+              <a:t>25/03/2021</a:t>
             </a:fld>
             <a:endParaRPr lang="en-GB" noProof="0"/>
           </a:p>
@@ -3928,7 +3928,7 @@
             </a:pPr>
             <a:fld id="{198AD64C-CCF5-CC4A-BA46-EEB0FF8EC03D}" type="datetime1">
               <a:rPr lang="en-GB" noProof="0" smtClean="0"/>
-              <a:t>18/02/2021</a:t>
+              <a:t>25/03/2021</a:t>
             </a:fld>
             <a:endParaRPr lang="en-GB" sz="1400" noProof="0"/>
           </a:p>
@@ -7508,7 +7508,7 @@
               </a14:hiddenLine>
             </a:ext>
             <a:ext uri="{FAA26D3D-D897-4be2-8F04-BA451C77F1D7}">
-              <ma14:placeholderFlag xmlns:ma14="http://schemas.microsoft.com/office/mac/drawingml/2011/main" xmlns="" val="1"/>
+              <ma14:placeholderFlag xmlns="" xmlns:ma14="http://schemas.microsoft.com/office/mac/drawingml/2011/main" val="1"/>
             </a:ext>
           </a:extLst>
         </p:spPr>
@@ -9950,7 +9950,7 @@
             </a:pPr>
             <a:fld id="{F36B4F74-2901-1B4A-A15E-8C1388FF047B}" type="datetime1">
               <a:rPr lang="en-GB" noProof="0" smtClean="0"/>
-              <a:t>18/02/2021</a:t>
+              <a:t>25/03/2021</a:t>
             </a:fld>
             <a:endParaRPr lang="en-GB" noProof="0"/>
           </a:p>
@@ -10246,7 +10246,7 @@
             </a:pPr>
             <a:fld id="{98FC4669-B5B2-424D-A5E6-D35A4A957E17}" type="datetime1">
               <a:rPr lang="en-GB" noProof="0" smtClean="0"/>
-              <a:t>18/02/2021</a:t>
+              <a:t>25/03/2021</a:t>
             </a:fld>
             <a:endParaRPr lang="en-GB" noProof="0"/>
           </a:p>
@@ -10443,7 +10443,7 @@
             </a:pPr>
             <a:fld id="{822CDA6A-1854-574C-A769-87800A426702}" type="datetime1">
               <a:rPr lang="en-GB" noProof="0" smtClean="0"/>
-              <a:t>18/02/2021</a:t>
+              <a:t>25/03/2021</a:t>
             </a:fld>
             <a:endParaRPr lang="en-GB" sz="1400" noProof="0"/>
           </a:p>
@@ -10541,7 +10541,7 @@
               </a14:hiddenLine>
             </a:ext>
             <a:ext uri="{FAA26D3D-D897-4be2-8F04-BA451C77F1D7}">
-              <ma14:placeholderFlag xmlns:ma14="http://schemas.microsoft.com/office/mac/drawingml/2011/main" xmlns="" val="1"/>
+              <ma14:placeholderFlag xmlns="" xmlns:ma14="http://schemas.microsoft.com/office/mac/drawingml/2011/main" val="1"/>
             </a:ext>
           </a:extLst>
         </p:spPr>
@@ -10785,7 +10785,7 @@
             </a:pPr>
             <a:fld id="{822CDA6A-1854-574C-A769-87800A426702}" type="datetime1">
               <a:rPr lang="en-GB" noProof="0" smtClean="0"/>
-              <a:t>18/02/2021</a:t>
+              <a:t>25/03/2021</a:t>
             </a:fld>
             <a:endParaRPr lang="en-GB" sz="1400" noProof="0"/>
           </a:p>
@@ -11013,7 +11013,7 @@
             </a:pPr>
             <a:fld id="{198AD64C-CCF5-CC4A-BA46-EEB0FF8EC03D}" type="datetime1">
               <a:rPr lang="en-GB" noProof="0" smtClean="0"/>
-              <a:t>18/02/2021</a:t>
+              <a:t>25/03/2021</a:t>
             </a:fld>
             <a:endParaRPr lang="en-GB" sz="1400" noProof="0"/>
           </a:p>
@@ -11144,7 +11144,7 @@
               </a14:hiddenLine>
             </a:ext>
             <a:ext uri="{FAA26D3D-D897-4be2-8F04-BA451C77F1D7}">
-              <ma14:placeholderFlag xmlns:ma14="http://schemas.microsoft.com/office/mac/drawingml/2011/main" xmlns="" val="1"/>
+              <ma14:placeholderFlag xmlns="" xmlns:ma14="http://schemas.microsoft.com/office/mac/drawingml/2011/main" val="1"/>
             </a:ext>
           </a:extLst>
         </p:spPr>
@@ -12521,7 +12521,7 @@
             </a:pPr>
             <a:fld id="{2FAF9002-F3AC-9D48-9425-5ADC68E24044}" type="datetime1">
               <a:rPr lang="en-GB" noProof="0" smtClean="0"/>
-              <a:t>18/02/2021</a:t>
+              <a:t>25/03/2021</a:t>
             </a:fld>
             <a:endParaRPr lang="en-GB" noProof="0"/>
           </a:p>
@@ -13882,7 +13882,7 @@
             </a:pPr>
             <a:fld id="{A5197BF1-BDDE-E74D-BA45-32BDC1105D8B}" type="datetime1">
               <a:rPr lang="en-GB" noProof="0" smtClean="0"/>
-              <a:t>18/02/2021</a:t>
+              <a:t>25/03/2021</a:t>
             </a:fld>
             <a:endParaRPr lang="en-GB" noProof="0"/>
           </a:p>
@@ -13929,7 +13929,7 @@
               </a14:hiddenLine>
             </a:ext>
             <a:ext uri="{FAA26D3D-D897-4be2-8F04-BA451C77F1D7}">
-              <ma14:placeholderFlag xmlns:ma14="http://schemas.microsoft.com/office/mac/drawingml/2011/main" xmlns="" val="1"/>
+              <ma14:placeholderFlag xmlns="" xmlns:ma14="http://schemas.microsoft.com/office/mac/drawingml/2011/main" val="1"/>
             </a:ext>
           </a:extLst>
         </p:spPr>
@@ -13999,7 +13999,7 @@
               </a14:hiddenLine>
             </a:ext>
             <a:ext uri="{FAA26D3D-D897-4be2-8F04-BA451C77F1D7}">
-              <ma14:placeholderFlag xmlns:ma14="http://schemas.microsoft.com/office/mac/drawingml/2011/main" xmlns="" val="1"/>
+              <ma14:placeholderFlag xmlns="" xmlns:ma14="http://schemas.microsoft.com/office/mac/drawingml/2011/main" val="1"/>
             </a:ext>
           </a:extLst>
         </p:spPr>
@@ -14679,7 +14679,7 @@
             </a:pPr>
             <a:fld id="{F36B4F74-2901-1B4A-A15E-8C1388FF047B}" type="datetime1">
               <a:rPr lang="en-GB" noProof="0" smtClean="0"/>
-              <a:t>18/02/2021</a:t>
+              <a:t>25/03/2021</a:t>
             </a:fld>
             <a:endParaRPr lang="en-GB" noProof="0" dirty="0"/>
           </a:p>
@@ -14954,6 +14954,7 @@
             <a:headEnd type="none" w="med" len="med"/>
             <a:tailEnd type="triangle"/>
           </a:ln>
+          <a:effectLst/>
         </p:spPr>
         <p:style>
           <a:lnRef idx="2">
@@ -14970,8 +14971,8 @@
           </a:fontRef>
         </p:style>
       </p:cxnSp>
-      <mc:AlternateContent xmlns:mc="http://schemas.openxmlformats.org/markup-compatibility/2006">
-        <mc:Choice xmlns:a14="http://schemas.microsoft.com/office/drawing/2010/main" Requires="a14">
+      <mc:AlternateContent xmlns:mc="http://schemas.openxmlformats.org/markup-compatibility/2006" xmlns:a14="http://schemas.microsoft.com/office/drawing/2010/main">
+        <mc:Choice Requires="a14">
           <p:sp>
             <p:nvSpPr>
               <p:cNvPr id="48" name="Textfeld 47">
@@ -15015,7 +15016,7 @@
                   </a14:hiddenLine>
                 </a:ext>
                 <a:ext uri="{FAA26D3D-D897-4be2-8F04-BA451C77F1D7}">
-                  <ma14:placeholderFlag xmlns:ma14="http://schemas.microsoft.com/office/mac/drawingml/2011/main" xmlns="" val="1"/>
+                  <ma14:placeholderFlag xmlns="" xmlns:ma14="http://schemas.microsoft.com/office/mac/drawingml/2011/main" val="1"/>
                 </a:ext>
               </a:extLst>
             </p:spPr>
@@ -15098,7 +15099,7 @@
             </p:txBody>
           </p:sp>
         </mc:Choice>
-        <mc:Fallback>
+        <mc:Fallback xmlns="">
           <p:sp>
             <p:nvSpPr>
               <p:cNvPr id="48" name="Textfeld 47">
@@ -15347,7 +15348,7 @@
                   </a14:hiddenLine>
                 </a:ext>
                 <a:ext uri="{FAA26D3D-D897-4be2-8F04-BA451C77F1D7}">
-                  <ma14:placeholderFlag xmlns:ma14="http://schemas.microsoft.com/office/mac/drawingml/2011/main" xmlns="" val="1"/>
+                  <ma14:placeholderFlag xmlns="" xmlns:ma14="http://schemas.microsoft.com/office/mac/drawingml/2011/main" val="1"/>
                 </a:ext>
               </a:extLst>
             </p:spPr>
@@ -15695,8 +15696,8 @@
           <a:effectLst/>
         </p:spPr>
       </p:cxnSp>
-      <mc:AlternateContent xmlns:mc="http://schemas.openxmlformats.org/markup-compatibility/2006">
-        <mc:Choice xmlns:a14="http://schemas.microsoft.com/office/drawing/2010/main" Requires="a14">
+      <mc:AlternateContent xmlns:mc="http://schemas.openxmlformats.org/markup-compatibility/2006" xmlns:a14="http://schemas.microsoft.com/office/drawing/2010/main">
+        <mc:Choice Requires="a14">
           <p:sp>
             <p:nvSpPr>
               <p:cNvPr id="59" name="Textfeld 58">
@@ -15740,7 +15741,7 @@
                   </a14:hiddenLine>
                 </a:ext>
                 <a:ext uri="{FAA26D3D-D897-4be2-8F04-BA451C77F1D7}">
-                  <ma14:placeholderFlag xmlns:ma14="http://schemas.microsoft.com/office/mac/drawingml/2011/main" xmlns="" val="1"/>
+                  <ma14:placeholderFlag xmlns="" xmlns:ma14="http://schemas.microsoft.com/office/mac/drawingml/2011/main" val="1"/>
                 </a:ext>
               </a:extLst>
             </p:spPr>
@@ -15833,7 +15834,7 @@
             </p:txBody>
           </p:sp>
         </mc:Choice>
-        <mc:Fallback>
+        <mc:Fallback xmlns="">
           <p:sp>
             <p:nvSpPr>
               <p:cNvPr id="59" name="Textfeld 58">
@@ -16115,7 +16116,7 @@
                   </a14:hiddenLine>
                 </a:ext>
                 <a:ext uri="{FAA26D3D-D897-4be2-8F04-BA451C77F1D7}">
-                  <ma14:placeholderFlag xmlns:ma14="http://schemas.microsoft.com/office/mac/drawingml/2011/main" xmlns="" val="1"/>
+                  <ma14:placeholderFlag xmlns="" xmlns:ma14="http://schemas.microsoft.com/office/mac/drawingml/2011/main" val="1"/>
                 </a:ext>
               </a:extLst>
             </p:spPr>
@@ -16347,7 +16348,7 @@
                   </a14:hiddenLine>
                 </a:ext>
                 <a:ext uri="{FAA26D3D-D897-4be2-8F04-BA451C77F1D7}">
-                  <ma14:placeholderFlag xmlns:ma14="http://schemas.microsoft.com/office/mac/drawingml/2011/main" xmlns="" val="1"/>
+                  <ma14:placeholderFlag xmlns="" xmlns:ma14="http://schemas.microsoft.com/office/mac/drawingml/2011/main" val="1"/>
                 </a:ext>
               </a:extLst>
             </p:spPr>
@@ -16489,8 +16490,8 @@
           </p:sp>
         </mc:Fallback>
       </mc:AlternateContent>
-      <mc:AlternateContent xmlns:mc="http://schemas.openxmlformats.org/markup-compatibility/2006">
-        <mc:Choice xmlns:a14="http://schemas.microsoft.com/office/drawing/2010/main" Requires="a14">
+      <mc:AlternateContent xmlns:mc="http://schemas.openxmlformats.org/markup-compatibility/2006" xmlns:a14="http://schemas.microsoft.com/office/drawing/2010/main">
+        <mc:Choice Requires="a14">
           <p:sp>
             <p:nvSpPr>
               <p:cNvPr id="66" name="Textfeld 65">
@@ -16534,7 +16535,7 @@
                   </a14:hiddenLine>
                 </a:ext>
                 <a:ext uri="{FAA26D3D-D897-4be2-8F04-BA451C77F1D7}">
-                  <ma14:placeholderFlag xmlns:ma14="http://schemas.microsoft.com/office/mac/drawingml/2011/main" xmlns="" val="1"/>
+                  <ma14:placeholderFlag xmlns="" xmlns:ma14="http://schemas.microsoft.com/office/mac/drawingml/2011/main" val="1"/>
                 </a:ext>
               </a:extLst>
             </p:spPr>
@@ -16606,7 +16607,7 @@
             </p:txBody>
           </p:sp>
         </mc:Choice>
-        <mc:Fallback>
+        <mc:Fallback xmlns="">
           <p:sp>
             <p:nvSpPr>
               <p:cNvPr id="66" name="Textfeld 65">
@@ -16862,8 +16863,8 @@
           </p:sp>
         </mc:Fallback>
       </mc:AlternateContent>
-      <mc:AlternateContent xmlns:mc="http://schemas.openxmlformats.org/markup-compatibility/2006">
-        <mc:Choice xmlns:a14="http://schemas.microsoft.com/office/drawing/2010/main" Requires="a14">
+      <mc:AlternateContent xmlns:mc="http://schemas.openxmlformats.org/markup-compatibility/2006" xmlns:a14="http://schemas.microsoft.com/office/drawing/2010/main">
+        <mc:Choice Requires="a14">
           <p:sp>
             <p:nvSpPr>
               <p:cNvPr id="72" name="Textfeld 71">
@@ -16907,7 +16908,7 @@
                   </a14:hiddenLine>
                 </a:ext>
                 <a:ext uri="{FAA26D3D-D897-4be2-8F04-BA451C77F1D7}">
-                  <ma14:placeholderFlag xmlns:ma14="http://schemas.microsoft.com/office/mac/drawingml/2011/main" xmlns="" val="1"/>
+                  <ma14:placeholderFlag xmlns="" xmlns:ma14="http://schemas.microsoft.com/office/mac/drawingml/2011/main" val="1"/>
                 </a:ext>
               </a:extLst>
             </p:spPr>
@@ -16994,7 +16995,7 @@
             </p:txBody>
           </p:sp>
         </mc:Choice>
-        <mc:Fallback>
+        <mc:Fallback xmlns="">
           <p:sp>
             <p:nvSpPr>
               <p:cNvPr id="72" name="Textfeld 71">
@@ -17111,19 +17112,18 @@
           </p:cNvPr>
           <p:cNvCxnSpPr>
             <a:cxnSpLocks/>
+            <a:stCxn id="45" idx="0"/>
             <a:endCxn id="70" idx="1"/>
           </p:cNvCxnSpPr>
           <p:nvPr/>
         </p:nvCxnSpPr>
         <p:spPr bwMode="auto">
-          <a:xfrm flipV="1">
-            <a:off x="2132375" y="2068193"/>
-            <a:ext cx="1447553" cy="884137"/>
+          <a:xfrm rot="5400000" flipH="1" flipV="1">
+            <a:off x="2420727" y="1572940"/>
+            <a:ext cx="663948" cy="1654454"/>
           </a:xfrm>
-          <a:prstGeom prst="bentConnector3">
-            <a:avLst>
-              <a:gd name="adj1" fmla="val -8"/>
-            </a:avLst>
+          <a:prstGeom prst="bentConnector2">
+            <a:avLst/>
           </a:prstGeom>
           <a:noFill/>
           <a:ln w="19050" cap="flat" cmpd="sng" algn="ctr">
@@ -17132,8 +17132,8 @@
             </a:solidFill>
             <a:prstDash val="solid"/>
             <a:round/>
-            <a:headEnd type="oval" w="med" len="med"/>
-            <a:tailEnd type="triangle"/>
+            <a:headEnd type="none" w="med" len="med"/>
+            <a:tailEnd type="triangle" w="med" len="med"/>
           </a:ln>
           <a:effectLst/>
         </p:spPr>
@@ -17251,7 +17251,7 @@
               </a14:hiddenLine>
             </a:ext>
             <a:ext uri="{FAA26D3D-D897-4be2-8F04-BA451C77F1D7}">
-              <ma14:placeholderFlag xmlns:ma14="http://schemas.microsoft.com/office/mac/drawingml/2011/main" xmlns="" val="1"/>
+              <ma14:placeholderFlag xmlns="" xmlns:ma14="http://schemas.microsoft.com/office/mac/drawingml/2011/main" val="1"/>
             </a:ext>
           </a:extLst>
         </p:spPr>
@@ -17661,7 +17661,7 @@
             </a14:hiddenLine>
           </a:ext>
           <a:ext uri="{FAA26D3D-D897-4be2-8F04-BA451C77F1D7}">
-            <ma14:placeholderFlag xmlns:ma14="http://schemas.microsoft.com/office/mac/drawingml/2011/main" xmlns="" val="1"/>
+            <ma14:placeholderFlag xmlns="" xmlns:ma14="http://schemas.microsoft.com/office/mac/drawingml/2011/main" val="1"/>
           </a:ext>
         </a:extLst>
       </a:spPr>

</xml_diff>